<commit_message>
Added pdf file and the HTTP request in the design doc
</commit_message>
<xml_diff>
--- a/doc/CSI OT 3D Platform Cyber Attack flow.pptx
+++ b/doc/CSI OT 3D Platform Cyber Attack flow.pptx
@@ -6,6 +6,8 @@
   </p:sldMasterIdLst>
   <p:sldIdLst>
     <p:sldId id="284" r:id="rId2"/>
+    <p:sldId id="285" r:id="rId3"/>
+    <p:sldId id="286" r:id="rId4"/>
   </p:sldIdLst>
   <p:sldSz cx="12192000" cy="6858000"/>
   <p:notesSz cx="6858000" cy="9144000"/>
@@ -261,7 +263,7 @@
           <a:p>
             <a:fld id="{62EF641D-0A1B-48F9-AE10-72F0F2C4A5DB}" type="datetimeFigureOut">
               <a:rPr lang="en-SG" smtClean="0"/>
-              <a:t>24/2/2021</a:t>
+              <a:t>10/5/2021</a:t>
             </a:fld>
             <a:endParaRPr lang="en-SG"/>
           </a:p>
@@ -461,7 +463,7 @@
           <a:p>
             <a:fld id="{62EF641D-0A1B-48F9-AE10-72F0F2C4A5DB}" type="datetimeFigureOut">
               <a:rPr lang="en-SG" smtClean="0"/>
-              <a:t>24/2/2021</a:t>
+              <a:t>10/5/2021</a:t>
             </a:fld>
             <a:endParaRPr lang="en-SG"/>
           </a:p>
@@ -671,7 +673,7 @@
           <a:p>
             <a:fld id="{62EF641D-0A1B-48F9-AE10-72F0F2C4A5DB}" type="datetimeFigureOut">
               <a:rPr lang="en-SG" smtClean="0"/>
-              <a:t>24/2/2021</a:t>
+              <a:t>10/5/2021</a:t>
             </a:fld>
             <a:endParaRPr lang="en-SG"/>
           </a:p>
@@ -871,7 +873,7 @@
           <a:p>
             <a:fld id="{62EF641D-0A1B-48F9-AE10-72F0F2C4A5DB}" type="datetimeFigureOut">
               <a:rPr lang="en-SG" smtClean="0"/>
-              <a:t>24/2/2021</a:t>
+              <a:t>10/5/2021</a:t>
             </a:fld>
             <a:endParaRPr lang="en-SG"/>
           </a:p>
@@ -1147,7 +1149,7 @@
           <a:p>
             <a:fld id="{62EF641D-0A1B-48F9-AE10-72F0F2C4A5DB}" type="datetimeFigureOut">
               <a:rPr lang="en-SG" smtClean="0"/>
-              <a:t>24/2/2021</a:t>
+              <a:t>10/5/2021</a:t>
             </a:fld>
             <a:endParaRPr lang="en-SG"/>
           </a:p>
@@ -1415,7 +1417,7 @@
           <a:p>
             <a:fld id="{62EF641D-0A1B-48F9-AE10-72F0F2C4A5DB}" type="datetimeFigureOut">
               <a:rPr lang="en-SG" smtClean="0"/>
-              <a:t>24/2/2021</a:t>
+              <a:t>10/5/2021</a:t>
             </a:fld>
             <a:endParaRPr lang="en-SG"/>
           </a:p>
@@ -1830,7 +1832,7 @@
           <a:p>
             <a:fld id="{62EF641D-0A1B-48F9-AE10-72F0F2C4A5DB}" type="datetimeFigureOut">
               <a:rPr lang="en-SG" smtClean="0"/>
-              <a:t>24/2/2021</a:t>
+              <a:t>10/5/2021</a:t>
             </a:fld>
             <a:endParaRPr lang="en-SG"/>
           </a:p>
@@ -1972,7 +1974,7 @@
           <a:p>
             <a:fld id="{62EF641D-0A1B-48F9-AE10-72F0F2C4A5DB}" type="datetimeFigureOut">
               <a:rPr lang="en-SG" smtClean="0"/>
-              <a:t>24/2/2021</a:t>
+              <a:t>10/5/2021</a:t>
             </a:fld>
             <a:endParaRPr lang="en-SG"/>
           </a:p>
@@ -2085,7 +2087,7 @@
           <a:p>
             <a:fld id="{62EF641D-0A1B-48F9-AE10-72F0F2C4A5DB}" type="datetimeFigureOut">
               <a:rPr lang="en-SG" smtClean="0"/>
-              <a:t>24/2/2021</a:t>
+              <a:t>10/5/2021</a:t>
             </a:fld>
             <a:endParaRPr lang="en-SG"/>
           </a:p>
@@ -2398,7 +2400,7 @@
           <a:p>
             <a:fld id="{62EF641D-0A1B-48F9-AE10-72F0F2C4A5DB}" type="datetimeFigureOut">
               <a:rPr lang="en-SG" smtClean="0"/>
-              <a:t>24/2/2021</a:t>
+              <a:t>10/5/2021</a:t>
             </a:fld>
             <a:endParaRPr lang="en-SG"/>
           </a:p>
@@ -2687,7 +2689,7 @@
           <a:p>
             <a:fld id="{62EF641D-0A1B-48F9-AE10-72F0F2C4A5DB}" type="datetimeFigureOut">
               <a:rPr lang="en-SG" smtClean="0"/>
-              <a:t>24/2/2021</a:t>
+              <a:t>10/5/2021</a:t>
             </a:fld>
             <a:endParaRPr lang="en-SG"/>
           </a:p>
@@ -2930,7 +2932,7 @@
           <a:p>
             <a:fld id="{62EF641D-0A1B-48F9-AE10-72F0F2C4A5DB}" type="datetimeFigureOut">
               <a:rPr lang="en-SG" smtClean="0"/>
-              <a:t>24/2/2021</a:t>
+              <a:t>10/5/2021</a:t>
             </a:fld>
             <a:endParaRPr lang="en-SG"/>
           </a:p>
@@ -5636,6 +5638,311 @@
 </p:sld>
 </file>
 
+<file path=ppt/slides/slide2.xml><?xml version="1.0" encoding="utf-8"?>
+<p:sld xmlns:a="http://schemas.openxmlformats.org/drawingml/2006/main" xmlns:r="http://schemas.openxmlformats.org/officeDocument/2006/relationships" xmlns:p="http://schemas.openxmlformats.org/presentationml/2006/main">
+  <p:cSld>
+    <p:spTree>
+      <p:nvGrpSpPr>
+        <p:cNvPr id="1" name=""/>
+        <p:cNvGrpSpPr/>
+        <p:nvPr/>
+      </p:nvGrpSpPr>
+      <p:grpSpPr>
+        <a:xfrm>
+          <a:off x="0" y="0"/>
+          <a:ext cx="0" cy="0"/>
+          <a:chOff x="0" y="0"/>
+          <a:chExt cx="0" cy="0"/>
+        </a:xfrm>
+      </p:grpSpPr>
+      <p:pic>
+        <p:nvPicPr>
+          <p:cNvPr id="5" name="Content Placeholder 4" descr="A picture containing text&#10;&#10;Description automatically generated">
+            <a:extLst>
+              <a:ext uri="{FF2B5EF4-FFF2-40B4-BE49-F238E27FC236}">
+                <a16:creationId xmlns:a16="http://schemas.microsoft.com/office/drawing/2014/main" id="{8F3A6372-C986-4C1A-82B2-B4A100DC6E3F}"/>
+              </a:ext>
+            </a:extLst>
+          </p:cNvPr>
+          <p:cNvPicPr>
+            <a:picLocks noGrp="1" noChangeAspect="1"/>
+          </p:cNvPicPr>
+          <p:nvPr>
+            <p:ph idx="1"/>
+          </p:nvPr>
+        </p:nvPicPr>
+        <p:blipFill>
+          <a:blip r:embed="rId2">
+            <a:extLst>
+              <a:ext uri="{28A0092B-C50C-407E-A947-70E740481C1C}">
+                <a14:useLocalDpi xmlns:a14="http://schemas.microsoft.com/office/drawing/2010/main" val="0"/>
+              </a:ext>
+            </a:extLst>
+          </a:blip>
+          <a:stretch>
+            <a:fillRect/>
+          </a:stretch>
+        </p:blipFill>
+        <p:spPr>
+          <a:xfrm>
+            <a:off x="1308100" y="384969"/>
+            <a:ext cx="7688792" cy="5766594"/>
+          </a:xfrm>
+        </p:spPr>
+      </p:pic>
+      <p:sp>
+        <p:nvSpPr>
+          <p:cNvPr id="6" name="Rectangle 5">
+            <a:extLst>
+              <a:ext uri="{FF2B5EF4-FFF2-40B4-BE49-F238E27FC236}">
+                <a16:creationId xmlns:a16="http://schemas.microsoft.com/office/drawing/2014/main" id="{3342A361-2296-4216-8B07-8FDDAF0A23CE}"/>
+              </a:ext>
+            </a:extLst>
+          </p:cNvPr>
+          <p:cNvSpPr/>
+          <p:nvPr/>
+        </p:nvSpPr>
+        <p:spPr>
+          <a:xfrm>
+            <a:off x="4250453" y="1798655"/>
+            <a:ext cx="1748413" cy="2994409"/>
+          </a:xfrm>
+          <a:prstGeom prst="rect">
+            <a:avLst/>
+          </a:prstGeom>
+          <a:noFill/>
+          <a:ln w="28575">
+            <a:solidFill>
+              <a:srgbClr val="FF0000"/>
+            </a:solidFill>
+            <a:prstDash val="sysDash"/>
+          </a:ln>
+        </p:spPr>
+        <p:style>
+          <a:lnRef idx="2">
+            <a:schemeClr val="accent1">
+              <a:shade val="50000"/>
+            </a:schemeClr>
+          </a:lnRef>
+          <a:fillRef idx="1">
+            <a:schemeClr val="accent1"/>
+          </a:fillRef>
+          <a:effectRef idx="0">
+            <a:schemeClr val="accent1"/>
+          </a:effectRef>
+          <a:fontRef idx="minor">
+            <a:schemeClr val="lt1"/>
+          </a:fontRef>
+        </p:style>
+        <p:txBody>
+          <a:bodyPr rtlCol="0" anchor="ctr"/>
+          <a:lstStyle/>
+          <a:p>
+            <a:pPr algn="ctr"/>
+            <a:endParaRPr lang="en-SG"/>
+          </a:p>
+        </p:txBody>
+      </p:sp>
+      <p:sp>
+        <p:nvSpPr>
+          <p:cNvPr id="8" name="Arrow: Down 7">
+            <a:extLst>
+              <a:ext uri="{FF2B5EF4-FFF2-40B4-BE49-F238E27FC236}">
+                <a16:creationId xmlns:a16="http://schemas.microsoft.com/office/drawing/2014/main" id="{3F42B54E-0462-4FD4-8E80-C4485BD5F9EC}"/>
+              </a:ext>
+            </a:extLst>
+          </p:cNvPr>
+          <p:cNvSpPr/>
+          <p:nvPr/>
+        </p:nvSpPr>
+        <p:spPr>
+          <a:xfrm rot="10800000">
+            <a:off x="4963885" y="4899556"/>
+            <a:ext cx="160774" cy="315538"/>
+          </a:xfrm>
+          <a:prstGeom prst="downArrow">
+            <a:avLst/>
+          </a:prstGeom>
+          <a:solidFill>
+            <a:srgbClr val="FF0000"/>
+          </a:solidFill>
+        </p:spPr>
+        <p:style>
+          <a:lnRef idx="2">
+            <a:schemeClr val="accent1">
+              <a:shade val="50000"/>
+            </a:schemeClr>
+          </a:lnRef>
+          <a:fillRef idx="1">
+            <a:schemeClr val="accent1"/>
+          </a:fillRef>
+          <a:effectRef idx="0">
+            <a:schemeClr val="accent1"/>
+          </a:effectRef>
+          <a:fontRef idx="minor">
+            <a:schemeClr val="lt1"/>
+          </a:fontRef>
+        </p:style>
+        <p:txBody>
+          <a:bodyPr rtlCol="0" anchor="ctr"/>
+          <a:lstStyle/>
+          <a:p>
+            <a:pPr algn="ctr"/>
+            <a:endParaRPr lang="en-SG" dirty="0"/>
+          </a:p>
+        </p:txBody>
+      </p:sp>
+      <p:sp>
+        <p:nvSpPr>
+          <p:cNvPr id="9" name="TextBox 8">
+            <a:extLst>
+              <a:ext uri="{FF2B5EF4-FFF2-40B4-BE49-F238E27FC236}">
+                <a16:creationId xmlns:a16="http://schemas.microsoft.com/office/drawing/2014/main" id="{C10F920F-1B07-4396-A785-AB15F5030CC8}"/>
+              </a:ext>
+            </a:extLst>
+          </p:cNvPr>
+          <p:cNvSpPr txBox="1"/>
+          <p:nvPr/>
+        </p:nvSpPr>
+        <p:spPr>
+          <a:xfrm>
+            <a:off x="4375424" y="5222857"/>
+            <a:ext cx="1412428" cy="307777"/>
+          </a:xfrm>
+          <a:prstGeom prst="rect">
+            <a:avLst/>
+          </a:prstGeom>
+          <a:solidFill>
+            <a:schemeClr val="bg1">
+              <a:lumMod val="95000"/>
+            </a:schemeClr>
+          </a:solidFill>
+          <a:ln w="12700">
+            <a:solidFill>
+              <a:srgbClr val="FF0000"/>
+            </a:solidFill>
+          </a:ln>
+        </p:spPr>
+        <p:txBody>
+          <a:bodyPr wrap="square" rtlCol="0">
+            <a:spAutoFit/>
+          </a:bodyPr>
+          <a:lstStyle/>
+          <a:p>
+            <a:r>
+              <a:rPr lang="en-SG" sz="1400" b="1" dirty="0">
+                <a:solidFill>
+                  <a:srgbClr val="FF0000"/>
+                </a:solidFill>
+                <a:effectLst/>
+                <a:latin typeface="Calibri" panose="020F0502020204030204" pitchFamily="34" charset="0"/>
+                <a:ea typeface="DengXian" panose="02010600030101010101" pitchFamily="2" charset="-122"/>
+                <a:cs typeface="Times New Roman" panose="02020603050405020304" pitchFamily="18" charset="0"/>
+              </a:rPr>
+              <a:t>Orchestrator PC</a:t>
+            </a:r>
+            <a:endParaRPr lang="en-SG" sz="1400" dirty="0">
+              <a:effectLst/>
+              <a:latin typeface="Calibri" panose="020F0502020204030204" pitchFamily="34" charset="0"/>
+              <a:ea typeface="DengXian" panose="02010600030101010101" pitchFamily="2" charset="-122"/>
+              <a:cs typeface="Times New Roman" panose="02020603050405020304" pitchFamily="18" charset="0"/>
+            </a:endParaRPr>
+          </a:p>
+        </p:txBody>
+      </p:sp>
+    </p:spTree>
+    <p:extLst>
+      <p:ext uri="{BB962C8B-B14F-4D97-AF65-F5344CB8AC3E}">
+        <p14:creationId xmlns:p14="http://schemas.microsoft.com/office/powerpoint/2010/main" val="2321892732"/>
+      </p:ext>
+    </p:extLst>
+  </p:cSld>
+  <p:clrMapOvr>
+    <a:masterClrMapping/>
+  </p:clrMapOvr>
+</p:sld>
+</file>
+
+<file path=ppt/slides/slide3.xml><?xml version="1.0" encoding="utf-8"?>
+<p:sld xmlns:a="http://schemas.openxmlformats.org/drawingml/2006/main" xmlns:r="http://schemas.openxmlformats.org/officeDocument/2006/relationships" xmlns:p="http://schemas.openxmlformats.org/presentationml/2006/main">
+  <p:cSld>
+    <p:spTree>
+      <p:nvGrpSpPr>
+        <p:cNvPr id="1" name=""/>
+        <p:cNvGrpSpPr/>
+        <p:nvPr/>
+      </p:nvGrpSpPr>
+      <p:grpSpPr>
+        <a:xfrm>
+          <a:off x="0" y="0"/>
+          <a:ext cx="0" cy="0"/>
+          <a:chOff x="0" y="0"/>
+          <a:chExt cx="0" cy="0"/>
+        </a:xfrm>
+      </p:grpSpPr>
+      <p:sp>
+        <p:nvSpPr>
+          <p:cNvPr id="2" name="Title 1">
+            <a:extLst>
+              <a:ext uri="{FF2B5EF4-FFF2-40B4-BE49-F238E27FC236}">
+                <a16:creationId xmlns:a16="http://schemas.microsoft.com/office/drawing/2014/main" id="{23E06ABA-5F34-431A-B9B9-57D3D7292AB8}"/>
+              </a:ext>
+            </a:extLst>
+          </p:cNvPr>
+          <p:cNvSpPr>
+            <a:spLocks noGrp="1"/>
+          </p:cNvSpPr>
+          <p:nvPr>
+            <p:ph type="title"/>
+          </p:nvPr>
+        </p:nvSpPr>
+        <p:spPr/>
+        <p:txBody>
+          <a:bodyPr/>
+          <a:lstStyle/>
+          <a:p>
+            <a:endParaRPr lang="en-SG"/>
+          </a:p>
+        </p:txBody>
+      </p:sp>
+      <p:sp>
+        <p:nvSpPr>
+          <p:cNvPr id="3" name="Content Placeholder 2">
+            <a:extLst>
+              <a:ext uri="{FF2B5EF4-FFF2-40B4-BE49-F238E27FC236}">
+                <a16:creationId xmlns:a16="http://schemas.microsoft.com/office/drawing/2014/main" id="{CF9F1F8A-D236-4A8B-B9EA-2C4811D1D67D}"/>
+              </a:ext>
+            </a:extLst>
+          </p:cNvPr>
+          <p:cNvSpPr>
+            <a:spLocks noGrp="1"/>
+          </p:cNvSpPr>
+          <p:nvPr>
+            <p:ph idx="1"/>
+          </p:nvPr>
+        </p:nvSpPr>
+        <p:spPr/>
+        <p:txBody>
+          <a:bodyPr/>
+          <a:lstStyle/>
+          <a:p>
+            <a:endParaRPr lang="en-SG" dirty="0"/>
+          </a:p>
+        </p:txBody>
+      </p:sp>
+    </p:spTree>
+    <p:extLst>
+      <p:ext uri="{BB962C8B-B14F-4D97-AF65-F5344CB8AC3E}">
+        <p14:creationId xmlns:p14="http://schemas.microsoft.com/office/powerpoint/2010/main" val="1900978723"/>
+      </p:ext>
+    </p:extLst>
+  </p:cSld>
+  <p:clrMapOvr>
+    <a:masterClrMapping/>
+  </p:clrMapOvr>
+</p:sld>
+</file>
+
 <file path=ppt/theme/theme1.xml><?xml version="1.0" encoding="utf-8"?>
 <a:theme xmlns:a="http://schemas.openxmlformats.org/drawingml/2006/main" name="Office Theme">
   <a:themeElements>

</xml_diff>

<commit_message>
change the document format and the code version.
</commit_message>
<xml_diff>
--- a/doc/CSI OT 3D Platform Cyber Attack flow.pptx
+++ b/doc/CSI OT 3D Platform Cyber Attack flow.pptx
@@ -263,7 +263,7 @@
           <a:p>
             <a:fld id="{62EF641D-0A1B-48F9-AE10-72F0F2C4A5DB}" type="datetimeFigureOut">
               <a:rPr lang="en-SG" smtClean="0"/>
-              <a:t>10/5/2021</a:t>
+              <a:t>12/5/2021</a:t>
             </a:fld>
             <a:endParaRPr lang="en-SG"/>
           </a:p>
@@ -463,7 +463,7 @@
           <a:p>
             <a:fld id="{62EF641D-0A1B-48F9-AE10-72F0F2C4A5DB}" type="datetimeFigureOut">
               <a:rPr lang="en-SG" smtClean="0"/>
-              <a:t>10/5/2021</a:t>
+              <a:t>12/5/2021</a:t>
             </a:fld>
             <a:endParaRPr lang="en-SG"/>
           </a:p>
@@ -673,7 +673,7 @@
           <a:p>
             <a:fld id="{62EF641D-0A1B-48F9-AE10-72F0F2C4A5DB}" type="datetimeFigureOut">
               <a:rPr lang="en-SG" smtClean="0"/>
-              <a:t>10/5/2021</a:t>
+              <a:t>12/5/2021</a:t>
             </a:fld>
             <a:endParaRPr lang="en-SG"/>
           </a:p>
@@ -873,7 +873,7 @@
           <a:p>
             <a:fld id="{62EF641D-0A1B-48F9-AE10-72F0F2C4A5DB}" type="datetimeFigureOut">
               <a:rPr lang="en-SG" smtClean="0"/>
-              <a:t>10/5/2021</a:t>
+              <a:t>12/5/2021</a:t>
             </a:fld>
             <a:endParaRPr lang="en-SG"/>
           </a:p>
@@ -1149,7 +1149,7 @@
           <a:p>
             <a:fld id="{62EF641D-0A1B-48F9-AE10-72F0F2C4A5DB}" type="datetimeFigureOut">
               <a:rPr lang="en-SG" smtClean="0"/>
-              <a:t>10/5/2021</a:t>
+              <a:t>12/5/2021</a:t>
             </a:fld>
             <a:endParaRPr lang="en-SG"/>
           </a:p>
@@ -1417,7 +1417,7 @@
           <a:p>
             <a:fld id="{62EF641D-0A1B-48F9-AE10-72F0F2C4A5DB}" type="datetimeFigureOut">
               <a:rPr lang="en-SG" smtClean="0"/>
-              <a:t>10/5/2021</a:t>
+              <a:t>12/5/2021</a:t>
             </a:fld>
             <a:endParaRPr lang="en-SG"/>
           </a:p>
@@ -1832,7 +1832,7 @@
           <a:p>
             <a:fld id="{62EF641D-0A1B-48F9-AE10-72F0F2C4A5DB}" type="datetimeFigureOut">
               <a:rPr lang="en-SG" smtClean="0"/>
-              <a:t>10/5/2021</a:t>
+              <a:t>12/5/2021</a:t>
             </a:fld>
             <a:endParaRPr lang="en-SG"/>
           </a:p>
@@ -1974,7 +1974,7 @@
           <a:p>
             <a:fld id="{62EF641D-0A1B-48F9-AE10-72F0F2C4A5DB}" type="datetimeFigureOut">
               <a:rPr lang="en-SG" smtClean="0"/>
-              <a:t>10/5/2021</a:t>
+              <a:t>12/5/2021</a:t>
             </a:fld>
             <a:endParaRPr lang="en-SG"/>
           </a:p>
@@ -2087,7 +2087,7 @@
           <a:p>
             <a:fld id="{62EF641D-0A1B-48F9-AE10-72F0F2C4A5DB}" type="datetimeFigureOut">
               <a:rPr lang="en-SG" smtClean="0"/>
-              <a:t>10/5/2021</a:t>
+              <a:t>12/5/2021</a:t>
             </a:fld>
             <a:endParaRPr lang="en-SG"/>
           </a:p>
@@ -2400,7 +2400,7 @@
           <a:p>
             <a:fld id="{62EF641D-0A1B-48F9-AE10-72F0F2C4A5DB}" type="datetimeFigureOut">
               <a:rPr lang="en-SG" smtClean="0"/>
-              <a:t>10/5/2021</a:t>
+              <a:t>12/5/2021</a:t>
             </a:fld>
             <a:endParaRPr lang="en-SG"/>
           </a:p>
@@ -2689,7 +2689,7 @@
           <a:p>
             <a:fld id="{62EF641D-0A1B-48F9-AE10-72F0F2C4A5DB}" type="datetimeFigureOut">
               <a:rPr lang="en-SG" smtClean="0"/>
-              <a:t>10/5/2021</a:t>
+              <a:t>12/5/2021</a:t>
             </a:fld>
             <a:endParaRPr lang="en-SG"/>
           </a:p>
@@ -2932,7 +2932,7 @@
           <a:p>
             <a:fld id="{62EF641D-0A1B-48F9-AE10-72F0F2C4A5DB}" type="datetimeFigureOut">
               <a:rPr lang="en-SG" smtClean="0"/>
-              <a:t>10/5/2021</a:t>
+              <a:t>12/5/2021</a:t>
             </a:fld>
             <a:endParaRPr lang="en-SG"/>
           </a:p>
@@ -5850,6 +5850,218 @@
           </a:p>
         </p:txBody>
       </p:sp>
+      <p:sp>
+        <p:nvSpPr>
+          <p:cNvPr id="7" name="TextBox 6">
+            <a:extLst>
+              <a:ext uri="{FF2B5EF4-FFF2-40B4-BE49-F238E27FC236}">
+                <a16:creationId xmlns:a16="http://schemas.microsoft.com/office/drawing/2014/main" id="{35CF4F45-20F3-4C0E-8592-4B84CC2ED83E}"/>
+              </a:ext>
+            </a:extLst>
+          </p:cNvPr>
+          <p:cNvSpPr txBox="1"/>
+          <p:nvPr/>
+        </p:nvSpPr>
+        <p:spPr>
+          <a:xfrm>
+            <a:off x="6669797" y="5376745"/>
+            <a:ext cx="1288498" cy="307777"/>
+          </a:xfrm>
+          <a:prstGeom prst="rect">
+            <a:avLst/>
+          </a:prstGeom>
+          <a:solidFill>
+            <a:schemeClr val="bg1">
+              <a:lumMod val="95000"/>
+            </a:schemeClr>
+          </a:solidFill>
+          <a:ln w="12700">
+            <a:solidFill>
+              <a:srgbClr val="FF0000"/>
+            </a:solidFill>
+          </a:ln>
+        </p:spPr>
+        <p:txBody>
+          <a:bodyPr wrap="square" rtlCol="0">
+            <a:spAutoFit/>
+          </a:bodyPr>
+          <a:lstStyle/>
+          <a:p>
+            <a:r>
+              <a:rPr lang="en-SG" sz="1400" b="1" dirty="0">
+                <a:solidFill>
+                  <a:srgbClr val="FF0000"/>
+                </a:solidFill>
+                <a:latin typeface="Calibri" panose="020F0502020204030204" pitchFamily="34" charset="0"/>
+                <a:ea typeface="DengXian" panose="02010600030101010101" pitchFamily="2" charset="-122"/>
+                <a:cs typeface="Times New Roman" panose="02020603050405020304" pitchFamily="18" charset="0"/>
+              </a:rPr>
+              <a:t>SCADA HMI PC</a:t>
+            </a:r>
+            <a:endParaRPr lang="en-SG" sz="1400" dirty="0">
+              <a:effectLst/>
+              <a:latin typeface="Calibri" panose="020F0502020204030204" pitchFamily="34" charset="0"/>
+              <a:ea typeface="DengXian" panose="02010600030101010101" pitchFamily="2" charset="-122"/>
+              <a:cs typeface="Times New Roman" panose="02020603050405020304" pitchFamily="18" charset="0"/>
+            </a:endParaRPr>
+          </a:p>
+        </p:txBody>
+      </p:sp>
+      <p:sp>
+        <p:nvSpPr>
+          <p:cNvPr id="10" name="Arrow: Down 9">
+            <a:extLst>
+              <a:ext uri="{FF2B5EF4-FFF2-40B4-BE49-F238E27FC236}">
+                <a16:creationId xmlns:a16="http://schemas.microsoft.com/office/drawing/2014/main" id="{EFCCA36A-49A0-452D-9870-B49C79BB8B93}"/>
+              </a:ext>
+            </a:extLst>
+          </p:cNvPr>
+          <p:cNvSpPr/>
+          <p:nvPr/>
+        </p:nvSpPr>
+        <p:spPr>
+          <a:xfrm rot="10800000">
+            <a:off x="7215237" y="4884936"/>
+            <a:ext cx="160774" cy="315538"/>
+          </a:xfrm>
+          <a:prstGeom prst="downArrow">
+            <a:avLst/>
+          </a:prstGeom>
+          <a:solidFill>
+            <a:srgbClr val="FF0000"/>
+          </a:solidFill>
+        </p:spPr>
+        <p:style>
+          <a:lnRef idx="2">
+            <a:schemeClr val="accent1">
+              <a:shade val="50000"/>
+            </a:schemeClr>
+          </a:lnRef>
+          <a:fillRef idx="1">
+            <a:schemeClr val="accent1"/>
+          </a:fillRef>
+          <a:effectRef idx="0">
+            <a:schemeClr val="accent1"/>
+          </a:effectRef>
+          <a:fontRef idx="minor">
+            <a:schemeClr val="lt1"/>
+          </a:fontRef>
+        </p:style>
+        <p:txBody>
+          <a:bodyPr rtlCol="0" anchor="ctr"/>
+          <a:lstStyle/>
+          <a:p>
+            <a:pPr algn="ctr"/>
+            <a:endParaRPr lang="en-SG" dirty="0"/>
+          </a:p>
+        </p:txBody>
+      </p:sp>
+      <p:sp>
+        <p:nvSpPr>
+          <p:cNvPr id="11" name="TextBox 10">
+            <a:extLst>
+              <a:ext uri="{FF2B5EF4-FFF2-40B4-BE49-F238E27FC236}">
+                <a16:creationId xmlns:a16="http://schemas.microsoft.com/office/drawing/2014/main" id="{B34856CE-8AF6-48B2-A3E0-3ADE163D008D}"/>
+              </a:ext>
+            </a:extLst>
+          </p:cNvPr>
+          <p:cNvSpPr txBox="1"/>
+          <p:nvPr/>
+        </p:nvSpPr>
+        <p:spPr>
+          <a:xfrm>
+            <a:off x="6025548" y="865701"/>
+            <a:ext cx="1189688" cy="307777"/>
+          </a:xfrm>
+          <a:prstGeom prst="rect">
+            <a:avLst/>
+          </a:prstGeom>
+          <a:solidFill>
+            <a:schemeClr val="bg1">
+              <a:lumMod val="95000"/>
+            </a:schemeClr>
+          </a:solidFill>
+          <a:ln w="12700">
+            <a:solidFill>
+              <a:srgbClr val="FF0000"/>
+            </a:solidFill>
+          </a:ln>
+        </p:spPr>
+        <p:txBody>
+          <a:bodyPr wrap="square" rtlCol="0">
+            <a:spAutoFit/>
+          </a:bodyPr>
+          <a:lstStyle/>
+          <a:p>
+            <a:r>
+              <a:rPr lang="en-SG" sz="1400" b="1" dirty="0">
+                <a:solidFill>
+                  <a:srgbClr val="FF0000"/>
+                </a:solidFill>
+                <a:latin typeface="Calibri" panose="020F0502020204030204" pitchFamily="34" charset="0"/>
+                <a:ea typeface="DengXian" panose="02010600030101010101" pitchFamily="2" charset="-122"/>
+                <a:cs typeface="Times New Roman" panose="02020603050405020304" pitchFamily="18" charset="0"/>
+              </a:rPr>
+              <a:t>Technical PC</a:t>
+            </a:r>
+            <a:endParaRPr lang="en-SG" sz="1400" dirty="0">
+              <a:effectLst/>
+              <a:latin typeface="Calibri" panose="020F0502020204030204" pitchFamily="34" charset="0"/>
+              <a:ea typeface="DengXian" panose="02010600030101010101" pitchFamily="2" charset="-122"/>
+              <a:cs typeface="Times New Roman" panose="02020603050405020304" pitchFamily="18" charset="0"/>
+            </a:endParaRPr>
+          </a:p>
+        </p:txBody>
+      </p:sp>
+      <p:sp>
+        <p:nvSpPr>
+          <p:cNvPr id="12" name="Arrow: Down 11">
+            <a:extLst>
+              <a:ext uri="{FF2B5EF4-FFF2-40B4-BE49-F238E27FC236}">
+                <a16:creationId xmlns:a16="http://schemas.microsoft.com/office/drawing/2014/main" id="{43930710-F69C-49BF-8449-6CECFAB14AEE}"/>
+              </a:ext>
+            </a:extLst>
+          </p:cNvPr>
+          <p:cNvSpPr/>
+          <p:nvPr/>
+        </p:nvSpPr>
+        <p:spPr>
+          <a:xfrm>
+            <a:off x="6589410" y="1335126"/>
+            <a:ext cx="160774" cy="315538"/>
+          </a:xfrm>
+          <a:prstGeom prst="downArrow">
+            <a:avLst/>
+          </a:prstGeom>
+          <a:solidFill>
+            <a:srgbClr val="FF0000"/>
+          </a:solidFill>
+        </p:spPr>
+        <p:style>
+          <a:lnRef idx="2">
+            <a:schemeClr val="accent1">
+              <a:shade val="50000"/>
+            </a:schemeClr>
+          </a:lnRef>
+          <a:fillRef idx="1">
+            <a:schemeClr val="accent1"/>
+          </a:fillRef>
+          <a:effectRef idx="0">
+            <a:schemeClr val="accent1"/>
+          </a:effectRef>
+          <a:fontRef idx="minor">
+            <a:schemeClr val="lt1"/>
+          </a:fontRef>
+        </p:style>
+        <p:txBody>
+          <a:bodyPr rtlCol="0" anchor="ctr"/>
+          <a:lstStyle/>
+          <a:p>
+            <a:pPr algn="ctr"/>
+            <a:endParaRPr lang="en-SG" dirty="0"/>
+          </a:p>
+        </p:txBody>
+      </p:sp>
     </p:spTree>
     <p:extLst>
       <p:ext uri="{BB962C8B-B14F-4D97-AF65-F5344CB8AC3E}">

</xml_diff>

<commit_message>
Update the main HMI introduction doc.
</commit_message>
<xml_diff>
--- a/doc/CSI OT 3D Platform Cyber Attack flow.pptx
+++ b/doc/CSI OT 3D Platform Cyber Attack flow.pptx
@@ -263,7 +263,7 @@
           <a:p>
             <a:fld id="{62EF641D-0A1B-48F9-AE10-72F0F2C4A5DB}" type="datetimeFigureOut">
               <a:rPr lang="en-SG" smtClean="0"/>
-              <a:t>12/5/2021</a:t>
+              <a:t>18/5/2021</a:t>
             </a:fld>
             <a:endParaRPr lang="en-SG"/>
           </a:p>
@@ -463,7 +463,7 @@
           <a:p>
             <a:fld id="{62EF641D-0A1B-48F9-AE10-72F0F2C4A5DB}" type="datetimeFigureOut">
               <a:rPr lang="en-SG" smtClean="0"/>
-              <a:t>12/5/2021</a:t>
+              <a:t>18/5/2021</a:t>
             </a:fld>
             <a:endParaRPr lang="en-SG"/>
           </a:p>
@@ -673,7 +673,7 @@
           <a:p>
             <a:fld id="{62EF641D-0A1B-48F9-AE10-72F0F2C4A5DB}" type="datetimeFigureOut">
               <a:rPr lang="en-SG" smtClean="0"/>
-              <a:t>12/5/2021</a:t>
+              <a:t>18/5/2021</a:t>
             </a:fld>
             <a:endParaRPr lang="en-SG"/>
           </a:p>
@@ -873,7 +873,7 @@
           <a:p>
             <a:fld id="{62EF641D-0A1B-48F9-AE10-72F0F2C4A5DB}" type="datetimeFigureOut">
               <a:rPr lang="en-SG" smtClean="0"/>
-              <a:t>12/5/2021</a:t>
+              <a:t>18/5/2021</a:t>
             </a:fld>
             <a:endParaRPr lang="en-SG"/>
           </a:p>
@@ -1149,7 +1149,7 @@
           <a:p>
             <a:fld id="{62EF641D-0A1B-48F9-AE10-72F0F2C4A5DB}" type="datetimeFigureOut">
               <a:rPr lang="en-SG" smtClean="0"/>
-              <a:t>12/5/2021</a:t>
+              <a:t>18/5/2021</a:t>
             </a:fld>
             <a:endParaRPr lang="en-SG"/>
           </a:p>
@@ -1417,7 +1417,7 @@
           <a:p>
             <a:fld id="{62EF641D-0A1B-48F9-AE10-72F0F2C4A5DB}" type="datetimeFigureOut">
               <a:rPr lang="en-SG" smtClean="0"/>
-              <a:t>12/5/2021</a:t>
+              <a:t>18/5/2021</a:t>
             </a:fld>
             <a:endParaRPr lang="en-SG"/>
           </a:p>
@@ -1832,7 +1832,7 @@
           <a:p>
             <a:fld id="{62EF641D-0A1B-48F9-AE10-72F0F2C4A5DB}" type="datetimeFigureOut">
               <a:rPr lang="en-SG" smtClean="0"/>
-              <a:t>12/5/2021</a:t>
+              <a:t>18/5/2021</a:t>
             </a:fld>
             <a:endParaRPr lang="en-SG"/>
           </a:p>
@@ -1974,7 +1974,7 @@
           <a:p>
             <a:fld id="{62EF641D-0A1B-48F9-AE10-72F0F2C4A5DB}" type="datetimeFigureOut">
               <a:rPr lang="en-SG" smtClean="0"/>
-              <a:t>12/5/2021</a:t>
+              <a:t>18/5/2021</a:t>
             </a:fld>
             <a:endParaRPr lang="en-SG"/>
           </a:p>
@@ -2087,7 +2087,7 @@
           <a:p>
             <a:fld id="{62EF641D-0A1B-48F9-AE10-72F0F2C4A5DB}" type="datetimeFigureOut">
               <a:rPr lang="en-SG" smtClean="0"/>
-              <a:t>12/5/2021</a:t>
+              <a:t>18/5/2021</a:t>
             </a:fld>
             <a:endParaRPr lang="en-SG"/>
           </a:p>
@@ -2400,7 +2400,7 @@
           <a:p>
             <a:fld id="{62EF641D-0A1B-48F9-AE10-72F0F2C4A5DB}" type="datetimeFigureOut">
               <a:rPr lang="en-SG" smtClean="0"/>
-              <a:t>12/5/2021</a:t>
+              <a:t>18/5/2021</a:t>
             </a:fld>
             <a:endParaRPr lang="en-SG"/>
           </a:p>
@@ -2689,7 +2689,7 @@
           <a:p>
             <a:fld id="{62EF641D-0A1B-48F9-AE10-72F0F2C4A5DB}" type="datetimeFigureOut">
               <a:rPr lang="en-SG" smtClean="0"/>
-              <a:t>12/5/2021</a:t>
+              <a:t>18/5/2021</a:t>
             </a:fld>
             <a:endParaRPr lang="en-SG"/>
           </a:p>
@@ -2932,7 +2932,7 @@
           <a:p>
             <a:fld id="{62EF641D-0A1B-48F9-AE10-72F0F2C4A5DB}" type="datetimeFigureOut">
               <a:rPr lang="en-SG" smtClean="0"/>
-              <a:t>12/5/2021</a:t>
+              <a:t>18/5/2021</a:t>
             </a:fld>
             <a:endParaRPr lang="en-SG"/>
           </a:p>
@@ -6142,6 +6142,36 @@
           </a:p>
         </p:txBody>
       </p:sp>
+      <p:pic>
+        <p:nvPicPr>
+          <p:cNvPr id="5" name="Picture 4">
+            <a:extLst>
+              <a:ext uri="{FF2B5EF4-FFF2-40B4-BE49-F238E27FC236}">
+                <a16:creationId xmlns:a16="http://schemas.microsoft.com/office/drawing/2014/main" id="{4464E976-338B-4D0F-820B-8145B96AD9F8}"/>
+              </a:ext>
+            </a:extLst>
+          </p:cNvPr>
+          <p:cNvPicPr>
+            <a:picLocks noChangeAspect="1"/>
+          </p:cNvPicPr>
+          <p:nvPr/>
+        </p:nvPicPr>
+        <p:blipFill>
+          <a:blip r:embed="rId2"/>
+          <a:stretch>
+            <a:fillRect/>
+          </a:stretch>
+        </p:blipFill>
+        <p:spPr>
+          <a:xfrm>
+            <a:off x="0" y="0"/>
+            <a:ext cx="12192000" cy="6858000"/>
+          </a:xfrm>
+          <a:prstGeom prst="rect">
+            <a:avLst/>
+          </a:prstGeom>
+        </p:spPr>
+      </p:pic>
     </p:spTree>
     <p:extLst>
       <p:ext uri="{BB962C8B-B14F-4D97-AF65-F5344CB8AC3E}">

</xml_diff>